<commit_message>
feat(doc) update power point
</commit_message>
<xml_diff>
--- a/Behavioral/ChainOfResp/DP - CoR.pptx
+++ b/Behavioral/ChainOfResp/DP - CoR.pptx
@@ -13086,25 +13086,8 @@
                 <a:latin typeface="+mj-lt"/>
                 <a:cs typeface="Times New Roman" pitchFamily="18" charset="0"/>
               </a:rPr>
-              <a:t>Design </a:t>
-            </a:r>
-            <a:r>
-              <a:rPr lang="fr-FR" sz="6600" b="1" dirty="0" err="1">
-                <a:solidFill>
-                  <a:schemeClr val="bg1"/>
-                </a:solidFill>
-                <a:latin typeface="+mj-lt"/>
-                <a:cs typeface="Times New Roman" pitchFamily="18" charset="0"/>
-              </a:rPr>
-              <a:t>Pattens</a:t>
-            </a:r>
-            <a:endParaRPr lang="fr-FR" sz="6600" b="1" dirty="0">
-              <a:solidFill>
-                <a:schemeClr val="bg1"/>
-              </a:solidFill>
-              <a:latin typeface="+mj-lt"/>
-              <a:cs typeface="Times New Roman" pitchFamily="18" charset="0"/>
-            </a:endParaRPr>
+              <a:t>Design Patterns</a:t>
+            </a:r>
           </a:p>
         </p:txBody>
       </p:sp>
@@ -13432,15 +13415,7 @@
           <a:p>
             <a:r>
               <a:rPr lang="en-US" altLang="fr-FR" dirty="0"/>
-              <a:t>Design </a:t>
-            </a:r>
-            <a:r>
-              <a:rPr lang="en-US" altLang="fr-FR" dirty="0" err="1"/>
-              <a:t>Pattens</a:t>
-            </a:r>
-            <a:r>
-              <a:rPr lang="en-US" altLang="fr-FR" dirty="0"/>
-              <a:t> - Chain of Responsibility</a:t>
+              <a:t>Design Patterns - Chain of Responsibility</a:t>
             </a:r>
           </a:p>
         </p:txBody>
@@ -13802,15 +13777,7 @@
           <a:p>
             <a:r>
               <a:rPr lang="en-US" altLang="fr-FR" dirty="0"/>
-              <a:t>Design </a:t>
-            </a:r>
-            <a:r>
-              <a:rPr lang="en-US" altLang="fr-FR" dirty="0" err="1"/>
-              <a:t>Pattens</a:t>
-            </a:r>
-            <a:r>
-              <a:rPr lang="en-US" altLang="fr-FR" dirty="0"/>
-              <a:t> - Chain of Responsibility</a:t>
+              <a:t>Design Patterns - Chain of Responsibility</a:t>
             </a:r>
           </a:p>
         </p:txBody>
@@ -14210,15 +14177,7 @@
           <a:p>
             <a:r>
               <a:rPr lang="en-US" altLang="fr-FR" dirty="0"/>
-              <a:t>Design </a:t>
-            </a:r>
-            <a:r>
-              <a:rPr lang="en-US" altLang="fr-FR" dirty="0" err="1"/>
-              <a:t>Pattens</a:t>
-            </a:r>
-            <a:r>
-              <a:rPr lang="en-US" altLang="fr-FR" dirty="0"/>
-              <a:t> - Chain of Responsibility</a:t>
+              <a:t>Design Patterns - Chain of Responsibility</a:t>
             </a:r>
           </a:p>
         </p:txBody>
@@ -14461,15 +14420,7 @@
           <a:p>
             <a:r>
               <a:rPr lang="en-US" altLang="fr-FR" dirty="0"/>
-              <a:t>Design </a:t>
-            </a:r>
-            <a:r>
-              <a:rPr lang="en-US" altLang="fr-FR" dirty="0" err="1"/>
-              <a:t>Pattens</a:t>
-            </a:r>
-            <a:r>
-              <a:rPr lang="en-US" altLang="fr-FR" dirty="0"/>
-              <a:t> - Chain of Responsibility</a:t>
+              <a:t>Design Patterns - Chain of Responsibility</a:t>
             </a:r>
           </a:p>
         </p:txBody>
@@ -15558,15 +15509,7 @@
           <a:p>
             <a:r>
               <a:rPr lang="en-US" altLang="fr-FR" dirty="0"/>
-              <a:t>Design </a:t>
-            </a:r>
-            <a:r>
-              <a:rPr lang="en-US" altLang="fr-FR" dirty="0" err="1"/>
-              <a:t>Pattens</a:t>
-            </a:r>
-            <a:r>
-              <a:rPr lang="en-US" altLang="fr-FR" dirty="0"/>
-              <a:t> - Chain of Responsibility</a:t>
+              <a:t>Design Patterns - Chain of Responsibility</a:t>
             </a:r>
           </a:p>
         </p:txBody>
@@ -15647,14 +15590,19 @@
         <p:spPr>
           <a:xfrm>
             <a:off x="4252415" y="2811434"/>
-            <a:ext cx="3905250" cy="830997"/>
+            <a:ext cx="3325585" cy="830997"/>
           </a:xfrm>
           <a:prstGeom prst="rect">
             <a:avLst/>
           </a:prstGeom>
+          <a:ln>
+            <a:solidFill>
+              <a:srgbClr val="92D050"/>
+            </a:solidFill>
+          </a:ln>
         </p:spPr>
         <p:txBody>
-          <a:bodyPr>
+          <a:bodyPr wrap="square">
             <a:spAutoFit/>
           </a:bodyPr>
           <a:lstStyle/>
@@ -16462,15 +16410,7 @@
           <a:p>
             <a:r>
               <a:rPr lang="en-US" altLang="fr-FR" dirty="0"/>
-              <a:t>Design </a:t>
-            </a:r>
-            <a:r>
-              <a:rPr lang="en-US" altLang="fr-FR" dirty="0" err="1"/>
-              <a:t>Pattens</a:t>
-            </a:r>
-            <a:r>
-              <a:rPr lang="en-US" altLang="fr-FR" dirty="0"/>
-              <a:t> - Chain of Responsibility</a:t>
+              <a:t>Design Patterns - Chain of Responsibility</a:t>
             </a:r>
           </a:p>
         </p:txBody>
@@ -16959,15 +16899,7 @@
           <a:p>
             <a:r>
               <a:rPr lang="en-US" altLang="fr-FR" dirty="0"/>
-              <a:t>Design </a:t>
-            </a:r>
-            <a:r>
-              <a:rPr lang="en-US" altLang="fr-FR" dirty="0" err="1"/>
-              <a:t>Pattens</a:t>
-            </a:r>
-            <a:r>
-              <a:rPr lang="en-US" altLang="fr-FR" dirty="0"/>
-              <a:t> - Chain of Responsibility</a:t>
+              <a:t>Design Patterns - Chain of Responsibility</a:t>
             </a:r>
           </a:p>
         </p:txBody>
@@ -17854,15 +17786,7 @@
           <a:p>
             <a:r>
               <a:rPr lang="en-US" altLang="fr-FR" dirty="0"/>
-              <a:t>Design </a:t>
-            </a:r>
-            <a:r>
-              <a:rPr lang="en-US" altLang="fr-FR" dirty="0" err="1"/>
-              <a:t>Pattens</a:t>
-            </a:r>
-            <a:r>
-              <a:rPr lang="en-US" altLang="fr-FR" dirty="0"/>
-              <a:t> - Chain of Responsibility</a:t>
+              <a:t>Design Patterns - Chain of Responsibility</a:t>
             </a:r>
           </a:p>
         </p:txBody>
@@ -18147,15 +18071,7 @@
           <a:p>
             <a:r>
               <a:rPr lang="en-US" altLang="fr-FR" dirty="0"/>
-              <a:t>Design </a:t>
-            </a:r>
-            <a:r>
-              <a:rPr lang="en-US" altLang="fr-FR" dirty="0" err="1"/>
-              <a:t>Pattens</a:t>
-            </a:r>
-            <a:r>
-              <a:rPr lang="en-US" altLang="fr-FR" dirty="0"/>
-              <a:t> - Chain of Responsibility</a:t>
+              <a:t>Design Patterns - Chain of Responsibility</a:t>
             </a:r>
           </a:p>
         </p:txBody>
@@ -18503,15 +18419,7 @@
           <a:p>
             <a:r>
               <a:rPr lang="en-US" altLang="fr-FR" dirty="0"/>
-              <a:t>Design </a:t>
-            </a:r>
-            <a:r>
-              <a:rPr lang="en-US" altLang="fr-FR" dirty="0" err="1"/>
-              <a:t>Pattens</a:t>
-            </a:r>
-            <a:r>
-              <a:rPr lang="en-US" altLang="fr-FR" dirty="0"/>
-              <a:t> - Chain of Responsibility</a:t>
+              <a:t>Design Patterns - Chain of Responsibility</a:t>
             </a:r>
           </a:p>
         </p:txBody>
@@ -18905,15 +18813,7 @@
           <a:p>
             <a:r>
               <a:rPr lang="en-US" altLang="fr-FR" dirty="0"/>
-              <a:t>Design </a:t>
-            </a:r>
-            <a:r>
-              <a:rPr lang="en-US" altLang="fr-FR" dirty="0" err="1"/>
-              <a:t>Pattens</a:t>
-            </a:r>
-            <a:r>
-              <a:rPr lang="en-US" altLang="fr-FR" dirty="0"/>
-              <a:t> - Chain of Responsibility</a:t>
+              <a:t>Design Patterns - Chain of Responsibility</a:t>
             </a:r>
           </a:p>
         </p:txBody>
@@ -19058,15 +18958,7 @@
           <a:p>
             <a:r>
               <a:rPr lang="en-US" altLang="fr-FR" dirty="0"/>
-              <a:t>Design </a:t>
-            </a:r>
-            <a:r>
-              <a:rPr lang="en-US" altLang="fr-FR" dirty="0" err="1"/>
-              <a:t>Pattens</a:t>
-            </a:r>
-            <a:r>
-              <a:rPr lang="en-US" altLang="fr-FR" dirty="0"/>
-              <a:t> - Chain of Responsibility</a:t>
+              <a:t>Design Patterns - Chain of Responsibility</a:t>
             </a:r>
           </a:p>
         </p:txBody>
@@ -19621,15 +19513,7 @@
           <a:p>
             <a:r>
               <a:rPr lang="en-US" altLang="fr-FR" dirty="0"/>
-              <a:t>Design </a:t>
-            </a:r>
-            <a:r>
-              <a:rPr lang="en-US" altLang="fr-FR" dirty="0" err="1"/>
-              <a:t>Pattens</a:t>
-            </a:r>
-            <a:r>
-              <a:rPr lang="en-US" altLang="fr-FR" dirty="0"/>
-              <a:t> - Chain of Responsibility</a:t>
+              <a:t>Design Patterns - Chain of Responsibility</a:t>
             </a:r>
           </a:p>
         </p:txBody>
@@ -20292,15 +20176,7 @@
           <a:p>
             <a:r>
               <a:rPr lang="en-US" altLang="fr-FR" dirty="0"/>
-              <a:t>Design </a:t>
-            </a:r>
-            <a:r>
-              <a:rPr lang="en-US" altLang="fr-FR" dirty="0" err="1"/>
-              <a:t>Pattens</a:t>
-            </a:r>
-            <a:r>
-              <a:rPr lang="en-US" altLang="fr-FR" dirty="0"/>
-              <a:t> - Chain of Responsibility</a:t>
+              <a:t>Design Patterns - Chain of Responsibility</a:t>
             </a:r>
           </a:p>
         </p:txBody>
@@ -20724,15 +20600,7 @@
           <a:p>
             <a:r>
               <a:rPr lang="en-US" altLang="fr-FR" dirty="0"/>
-              <a:t>Design </a:t>
-            </a:r>
-            <a:r>
-              <a:rPr lang="en-US" altLang="fr-FR" dirty="0" err="1"/>
-              <a:t>Pattens</a:t>
-            </a:r>
-            <a:r>
-              <a:rPr lang="en-US" altLang="fr-FR" dirty="0"/>
-              <a:t> - Chain of Responsibility</a:t>
+              <a:t>Design Patterns - Chain of Responsibility</a:t>
             </a:r>
           </a:p>
         </p:txBody>
@@ -21225,15 +21093,7 @@
           <a:p>
             <a:r>
               <a:rPr lang="en-US" altLang="fr-FR" dirty="0"/>
-              <a:t>Design </a:t>
-            </a:r>
-            <a:r>
-              <a:rPr lang="en-US" altLang="fr-FR" dirty="0" err="1"/>
-              <a:t>Pattens</a:t>
-            </a:r>
-            <a:r>
-              <a:rPr lang="en-US" altLang="fr-FR" dirty="0"/>
-              <a:t> - Chain of Responsibility</a:t>
+              <a:t>Design Patterns - Chain of Responsibility</a:t>
             </a:r>
           </a:p>
         </p:txBody>

</xml_diff>